<commit_message>
Added materials for SOLID chapter
</commit_message>
<xml_diff>
--- a/ASWC/Presentations/ASWC_Day4.pptx
+++ b/ASWC/Presentations/ASWC_Day4.pptx
@@ -211,7 +211,7 @@
           <a:p>
             <a:fld id="{5AF45E1F-672A-488E-8B7A-DEADDD2FB2E5}" type="datetimeFigureOut">
               <a:rPr lang="da-DK" smtClean="0"/>
-              <a:t>26-02-2019</a:t>
+              <a:t>27-02-2019</a:t>
             </a:fld>
             <a:endParaRPr lang="da-DK"/>
           </a:p>
@@ -610,7 +610,7 @@
           <a:p>
             <a:fld id="{04527E70-C461-477F-BF52-CFCF7D612977}" type="datetimeFigureOut">
               <a:rPr lang="da-DK" smtClean="0"/>
-              <a:t>26-02-2019</a:t>
+              <a:t>27-02-2019</a:t>
             </a:fld>
             <a:endParaRPr lang="da-DK"/>
           </a:p>
@@ -780,7 +780,7 @@
           <a:p>
             <a:fld id="{04527E70-C461-477F-BF52-CFCF7D612977}" type="datetimeFigureOut">
               <a:rPr lang="da-DK" smtClean="0"/>
-              <a:t>26-02-2019</a:t>
+              <a:t>27-02-2019</a:t>
             </a:fld>
             <a:endParaRPr lang="da-DK"/>
           </a:p>
@@ -960,7 +960,7 @@
           <a:p>
             <a:fld id="{04527E70-C461-477F-BF52-CFCF7D612977}" type="datetimeFigureOut">
               <a:rPr lang="da-DK" smtClean="0"/>
-              <a:t>26-02-2019</a:t>
+              <a:t>27-02-2019</a:t>
             </a:fld>
             <a:endParaRPr lang="da-DK"/>
           </a:p>
@@ -1130,7 +1130,7 @@
           <a:p>
             <a:fld id="{04527E70-C461-477F-BF52-CFCF7D612977}" type="datetimeFigureOut">
               <a:rPr lang="da-DK" smtClean="0"/>
-              <a:t>26-02-2019</a:t>
+              <a:t>27-02-2019</a:t>
             </a:fld>
             <a:endParaRPr lang="da-DK"/>
           </a:p>
@@ -1376,7 +1376,7 @@
           <a:p>
             <a:fld id="{04527E70-C461-477F-BF52-CFCF7D612977}" type="datetimeFigureOut">
               <a:rPr lang="da-DK" smtClean="0"/>
-              <a:t>26-02-2019</a:t>
+              <a:t>27-02-2019</a:t>
             </a:fld>
             <a:endParaRPr lang="da-DK"/>
           </a:p>
@@ -1608,7 +1608,7 @@
           <a:p>
             <a:fld id="{04527E70-C461-477F-BF52-CFCF7D612977}" type="datetimeFigureOut">
               <a:rPr lang="da-DK" smtClean="0"/>
-              <a:t>26-02-2019</a:t>
+              <a:t>27-02-2019</a:t>
             </a:fld>
             <a:endParaRPr lang="da-DK"/>
           </a:p>
@@ -1975,7 +1975,7 @@
           <a:p>
             <a:fld id="{04527E70-C461-477F-BF52-CFCF7D612977}" type="datetimeFigureOut">
               <a:rPr lang="da-DK" smtClean="0"/>
-              <a:t>26-02-2019</a:t>
+              <a:t>27-02-2019</a:t>
             </a:fld>
             <a:endParaRPr lang="da-DK"/>
           </a:p>
@@ -2093,7 +2093,7 @@
           <a:p>
             <a:fld id="{04527E70-C461-477F-BF52-CFCF7D612977}" type="datetimeFigureOut">
               <a:rPr lang="da-DK" smtClean="0"/>
-              <a:t>26-02-2019</a:t>
+              <a:t>27-02-2019</a:t>
             </a:fld>
             <a:endParaRPr lang="da-DK"/>
           </a:p>
@@ -2188,7 +2188,7 @@
           <a:p>
             <a:fld id="{04527E70-C461-477F-BF52-CFCF7D612977}" type="datetimeFigureOut">
               <a:rPr lang="da-DK" smtClean="0"/>
-              <a:t>26-02-2019</a:t>
+              <a:t>27-02-2019</a:t>
             </a:fld>
             <a:endParaRPr lang="da-DK"/>
           </a:p>
@@ -2465,7 +2465,7 @@
           <a:p>
             <a:fld id="{04527E70-C461-477F-BF52-CFCF7D612977}" type="datetimeFigureOut">
               <a:rPr lang="da-DK" smtClean="0"/>
-              <a:t>26-02-2019</a:t>
+              <a:t>27-02-2019</a:t>
             </a:fld>
             <a:endParaRPr lang="da-DK"/>
           </a:p>
@@ -2718,7 +2718,7 @@
           <a:p>
             <a:fld id="{04527E70-C461-477F-BF52-CFCF7D612977}" type="datetimeFigureOut">
               <a:rPr lang="da-DK" smtClean="0"/>
-              <a:t>26-02-2019</a:t>
+              <a:t>27-02-2019</a:t>
             </a:fld>
             <a:endParaRPr lang="da-DK"/>
           </a:p>
@@ -2931,7 +2931,7 @@
           <a:p>
             <a:fld id="{04527E70-C461-477F-BF52-CFCF7D612977}" type="datetimeFigureOut">
               <a:rPr lang="da-DK" smtClean="0"/>
-              <a:t>26-02-2019</a:t>
+              <a:t>27-02-2019</a:t>
             </a:fld>
             <a:endParaRPr lang="da-DK"/>
           </a:p>
@@ -3394,15 +3394,7 @@
                   <a:srgbClr val="FF0000"/>
                 </a:solidFill>
               </a:rPr>
-              <a:t>Day </a:t>
-            </a:r>
-            <a:r>
-              <a:rPr lang="da-DK" sz="7200" smtClean="0">
-                <a:solidFill>
-                  <a:srgbClr val="FF0000"/>
-                </a:solidFill>
-              </a:rPr>
-              <a:t>4</a:t>
+              <a:t>Day 4</a:t>
             </a:r>
             <a:endParaRPr lang="da-DK" sz="7200">
               <a:solidFill>
@@ -4803,16 +4795,7 @@
                 </a:solidFill>
                 <a:latin typeface="Consolas" panose="020B0609020204030204" pitchFamily="49" charset="0"/>
               </a:rPr>
-              <a:t>"</a:t>
-            </a:r>
-            <a:r>
-              <a:rPr lang="en-US" sz="2000" b="1">
-                <a:solidFill>
-                  <a:srgbClr val="A31515"/>
-                </a:solidFill>
-                <a:latin typeface="Consolas" panose="020B0609020204030204" pitchFamily="49" charset="0"/>
-              </a:rPr>
-              <a:t>Time</a:t>
+              <a:t>"Time</a:t>
             </a:r>
             <a:r>
               <a:rPr lang="en-US" sz="2000" b="1" smtClean="0">
@@ -4888,16 +4871,7 @@
                 </a:solidFill>
                 <a:latin typeface="Consolas" panose="020B0609020204030204" pitchFamily="49" charset="0"/>
               </a:rPr>
-              <a:t>"</a:t>
-            </a:r>
-            <a:r>
-              <a:rPr lang="en-US" sz="2000" b="1">
-                <a:solidFill>
-                  <a:srgbClr val="A31515"/>
-                </a:solidFill>
-                <a:latin typeface="Consolas" panose="020B0609020204030204" pitchFamily="49" charset="0"/>
-              </a:rPr>
-              <a:t>Reset</a:t>
+              <a:t>"Reset</a:t>
             </a:r>
             <a:r>
               <a:rPr lang="en-US" sz="2000" b="1" smtClean="0">
@@ -4987,7 +4961,25 @@
                 </a:solidFill>
                 <a:latin typeface="Consolas" panose="020B0609020204030204" pitchFamily="49" charset="0"/>
               </a:rPr>
-              <a:t> anObject </a:t>
+              <a:t> anObject = </a:t>
+            </a:r>
+            <a:r>
+              <a:rPr lang="en-US" sz="2000" b="1" smtClean="0">
+                <a:solidFill>
+                  <a:srgbClr val="2B91AF"/>
+                </a:solidFill>
+                <a:latin typeface="Consolas" panose="020B0609020204030204" pitchFamily="49" charset="0"/>
+              </a:rPr>
+              <a:t>Activator</a:t>
+            </a:r>
+            <a:r>
+              <a:rPr lang="en-US" sz="2000" b="1" smtClean="0">
+                <a:solidFill>
+                  <a:srgbClr val="000000"/>
+                </a:solidFill>
+                <a:latin typeface="Consolas" panose="020B0609020204030204" pitchFamily="49" charset="0"/>
+              </a:rPr>
+              <a:t>.CreateInstance(miReset.DeclaringType</a:t>
             </a:r>
             <a:r>
               <a:rPr lang="en-US" sz="2000" b="1">
@@ -4996,43 +4988,7 @@
                 </a:solidFill>
                 <a:latin typeface="Consolas" panose="020B0609020204030204" pitchFamily="49" charset="0"/>
               </a:rPr>
-              <a:t>= </a:t>
-            </a:r>
-            <a:r>
-              <a:rPr lang="en-US" sz="2000" b="1" smtClean="0">
-                <a:solidFill>
-                  <a:srgbClr val="2B91AF"/>
-                </a:solidFill>
-                <a:latin typeface="Consolas" panose="020B0609020204030204" pitchFamily="49" charset="0"/>
-              </a:rPr>
-              <a:t>Activator</a:t>
-            </a:r>
-            <a:r>
-              <a:rPr lang="en-US" sz="2000" b="1" smtClean="0">
-                <a:solidFill>
-                  <a:srgbClr val="000000"/>
-                </a:solidFill>
-                <a:latin typeface="Consolas" panose="020B0609020204030204" pitchFamily="49" charset="0"/>
-              </a:rPr>
-              <a:t>.CreateInstance(miReset.DeclaringType</a:t>
-            </a:r>
-            <a:r>
-              <a:rPr lang="en-US" sz="2000" b="1">
-                <a:solidFill>
-                  <a:srgbClr val="000000"/>
-                </a:solidFill>
-                <a:latin typeface="Consolas" panose="020B0609020204030204" pitchFamily="49" charset="0"/>
-              </a:rPr>
-              <a:t>, 11, </a:t>
-            </a:r>
-            <a:r>
-              <a:rPr lang="en-US" sz="2000" b="1">
-                <a:solidFill>
-                  <a:srgbClr val="000000"/>
-                </a:solidFill>
-                <a:latin typeface="Consolas" panose="020B0609020204030204" pitchFamily="49" charset="0"/>
-              </a:rPr>
-              <a:t>20</a:t>
+              <a:t>, 11, 20</a:t>
             </a:r>
             <a:r>
               <a:rPr lang="en-US" sz="2000" b="1" smtClean="0">
@@ -5263,15 +5219,7 @@
           <a:p>
             <a:r>
               <a:rPr lang="da-DK" b="1" smtClean="0"/>
-              <a:t>ASWC Day </a:t>
-            </a:r>
-            <a:r>
-              <a:rPr lang="da-DK" b="1" smtClean="0"/>
-              <a:t>4 </a:t>
-            </a:r>
-            <a:r>
-              <a:rPr lang="da-DK" b="1" smtClean="0"/>
-              <a:t>- agenda</a:t>
+              <a:t>ASWC Day 4 - agenda</a:t>
             </a:r>
             <a:endParaRPr lang="da-DK" b="1"/>
           </a:p>
@@ -5294,47 +5242,60 @@
           <a:p>
             <a:r>
               <a:rPr lang="da-DK" smtClean="0"/>
+              <a:t>New</a:t>
+            </a:r>
+            <a:r>
+              <a:rPr lang="da-DK" smtClean="0"/>
+              <a:t>(-ish) topics</a:t>
+            </a:r>
+          </a:p>
+          <a:p>
+            <a:pPr lvl="1"/>
+            <a:r>
+              <a:rPr lang="da-DK" smtClean="0"/>
+              <a:t>Extension methods</a:t>
+            </a:r>
+          </a:p>
+          <a:p>
+            <a:pPr lvl="1"/>
+            <a:r>
+              <a:rPr lang="da-DK" smtClean="0"/>
+              <a:t>Anonymous types</a:t>
+            </a:r>
+          </a:p>
+          <a:p>
+            <a:pPr lvl="1"/>
+            <a:r>
+              <a:rPr lang="da-DK" smtClean="0"/>
+              <a:t>Reflection</a:t>
+            </a:r>
+          </a:p>
+          <a:p>
+            <a:r>
+              <a:rPr lang="da-DK" smtClean="0"/>
+              <a:t>…and then</a:t>
+            </a:r>
+          </a:p>
+          <a:p>
+            <a:pPr lvl="1"/>
+            <a:r>
+              <a:rPr lang="da-DK" smtClean="0"/>
+              <a:t>Free-for-all </a:t>
+            </a:r>
+            <a:r>
+              <a:rPr lang="da-DK" smtClean="0"/>
+              <a:t>exercise </a:t>
+            </a:r>
+            <a:r>
+              <a:rPr lang="da-DK" smtClean="0"/>
+              <a:t>work</a:t>
+            </a:r>
+          </a:p>
+          <a:p>
+            <a:pPr lvl="1"/>
+            <a:r>
+              <a:rPr lang="da-DK"/>
               <a:t>Follow-up on previous exercises (on request)</a:t>
-            </a:r>
-          </a:p>
-          <a:p>
-            <a:r>
-              <a:rPr lang="da-DK" smtClean="0"/>
-              <a:t>New(-ish) </a:t>
-            </a:r>
-            <a:r>
-              <a:rPr lang="da-DK" smtClean="0"/>
-              <a:t>topics</a:t>
-            </a:r>
-          </a:p>
-          <a:p>
-            <a:pPr lvl="1"/>
-            <a:r>
-              <a:rPr lang="da-DK" smtClean="0"/>
-              <a:t>Extension methods</a:t>
-            </a:r>
-            <a:endParaRPr lang="da-DK" smtClean="0"/>
-          </a:p>
-          <a:p>
-            <a:pPr lvl="1"/>
-            <a:r>
-              <a:rPr lang="da-DK" smtClean="0"/>
-              <a:t>Anonymous types</a:t>
-            </a:r>
-            <a:endParaRPr lang="da-DK" smtClean="0"/>
-          </a:p>
-          <a:p>
-            <a:pPr lvl="1"/>
-            <a:r>
-              <a:rPr lang="da-DK" smtClean="0"/>
-              <a:t>Reflection</a:t>
-            </a:r>
-            <a:endParaRPr lang="da-DK" smtClean="0"/>
-          </a:p>
-          <a:p>
-            <a:r>
-              <a:rPr lang="da-DK" smtClean="0"/>
-              <a:t>Free-for-all exercise work</a:t>
             </a:r>
             <a:endParaRPr lang="da-DK"/>
           </a:p>
@@ -5524,7 +5485,6 @@
               <a:rPr lang="da-DK" b="1"/>
               <a:t>Extension methods</a:t>
             </a:r>
-            <a:endParaRPr lang="da-DK" b="1"/>
           </a:p>
         </p:txBody>
       </p:sp>
@@ -6111,7 +6071,6 @@
               <a:rPr lang="da-DK" b="1"/>
               <a:t>Extension methods</a:t>
             </a:r>
-            <a:endParaRPr lang="da-DK" b="1"/>
           </a:p>
         </p:txBody>
       </p:sp>
@@ -6616,7 +6575,6 @@
               <a:rPr lang="da-DK" b="1"/>
               <a:t>Extension methods</a:t>
             </a:r>
-            <a:endParaRPr lang="da-DK" b="1"/>
           </a:p>
         </p:txBody>
       </p:sp>
@@ -6830,16 +6788,7 @@
                 </a:solidFill>
                 <a:latin typeface="Consolas" panose="020B0609020204030204" pitchFamily="49" charset="0"/>
               </a:rPr>
-              <a:t>, </a:t>
-            </a:r>
-            <a:r>
-              <a:rPr lang="en-US" sz="2000" b="1">
-                <a:solidFill>
-                  <a:srgbClr val="000000"/>
-                </a:solidFill>
-                <a:latin typeface="Consolas" panose="020B0609020204030204" pitchFamily="49" charset="0"/>
-              </a:rPr>
-              <a:t>106</a:t>
+              <a:t>, 106</a:t>
             </a:r>
             <a:r>
               <a:rPr lang="en-US" sz="2000" b="1" smtClean="0">
@@ -7795,16 +7744,7 @@
                 </a:solidFill>
                 <a:latin typeface="Consolas" panose="020B0609020204030204" pitchFamily="49" charset="0"/>
               </a:rPr>
-              <a:t>// Which of these will work when called </a:t>
-            </a:r>
-            <a:r>
-              <a:rPr lang="da-DK" sz="1800" b="1">
-                <a:solidFill>
-                  <a:srgbClr val="008000"/>
-                </a:solidFill>
-                <a:latin typeface="Consolas" panose="020B0609020204030204" pitchFamily="49" charset="0"/>
-              </a:rPr>
-              <a:t>with </a:t>
+              <a:t>// Which of these will work when called with </a:t>
             </a:r>
             <a:r>
               <a:rPr lang="da-DK" sz="1800" b="1" smtClean="0">
@@ -8383,16 +8323,7 @@
                 </a:solidFill>
                 <a:latin typeface="Consolas" panose="020B0609020204030204" pitchFamily="49" charset="0"/>
               </a:rPr>
-              <a:t>// Which of these will work when called </a:t>
-            </a:r>
-            <a:r>
-              <a:rPr lang="da-DK" sz="1800" b="1">
-                <a:solidFill>
-                  <a:srgbClr val="008000"/>
-                </a:solidFill>
-                <a:latin typeface="Consolas" panose="020B0609020204030204" pitchFamily="49" charset="0"/>
-              </a:rPr>
-              <a:t>with </a:t>
+              <a:t>// Which of these will work when called with </a:t>
             </a:r>
             <a:r>
               <a:rPr lang="da-DK" sz="1800" b="1" smtClean="0">

</xml_diff>